<commit_message>
Update the code and results for the iterative method
</commit_message>
<xml_diff>
--- a/demo/UOM_239375E.pptx
+++ b/demo/UOM_239375E.pptx
@@ -128,7 +128,7 @@
 <file path=ppt/revisionInfo.xml><?xml version="1.0" encoding="utf-8"?>
 <p1510:revInfo xmlns:a="http://schemas.openxmlformats.org/drawingml/2006/main" xmlns:r="http://schemas.openxmlformats.org/officeDocument/2006/relationships" xmlns:p1510="http://schemas.microsoft.com/office/powerpoint/2015/10/main">
   <p1510:revLst>
-    <p1510:client id="{8D9901AA-0508-43E4-B5FE-8E3D12EA834E}" v="256" dt="2023-03-01T11:50:30.421"/>
+    <p1510:client id="{8D9901AA-0508-43E4-B5FE-8E3D12EA834E}" v="264" dt="2023-03-05T15:25:03.567"/>
   </p1510:revLst>
 </p1510:revInfo>
 </file>
@@ -138,7 +138,7 @@
   <pc:docChgLst>
     <pc:chgData name="Chinthalanka Wijesinghe" userId="938c8838-3479-4f4c-85d6-560499bd7008" providerId="ADAL" clId="{8D9901AA-0508-43E4-B5FE-8E3D12EA834E}"/>
     <pc:docChg chg="undo custSel addSld delSld modSld sldOrd addMainMaster delMainMaster">
-      <pc:chgData name="Chinthalanka Wijesinghe" userId="938c8838-3479-4f4c-85d6-560499bd7008" providerId="ADAL" clId="{8D9901AA-0508-43E4-B5FE-8E3D12EA834E}" dt="2023-03-01T12:15:26.107" v="6020" actId="20577"/>
+      <pc:chgData name="Chinthalanka Wijesinghe" userId="938c8838-3479-4f4c-85d6-560499bd7008" providerId="ADAL" clId="{8D9901AA-0508-43E4-B5FE-8E3D12EA834E}" dt="2023-03-05T15:52:38.370" v="6206"/>
       <pc:docMkLst>
         <pc:docMk/>
       </pc:docMkLst>
@@ -1025,8 +1025,8 @@
           </ac:cxnSpMkLst>
         </pc:cxnChg>
       </pc:sldChg>
-      <pc:sldChg chg="addSp delSp modSp add mod modNotesTx">
-        <pc:chgData name="Chinthalanka Wijesinghe" userId="938c8838-3479-4f4c-85d6-560499bd7008" providerId="ADAL" clId="{8D9901AA-0508-43E4-B5FE-8E3D12EA834E}" dt="2023-03-01T08:59:06.583" v="4790" actId="403"/>
+      <pc:sldChg chg="addSp delSp modSp add mod ord modNotesTx">
+        <pc:chgData name="Chinthalanka Wijesinghe" userId="938c8838-3479-4f4c-85d6-560499bd7008" providerId="ADAL" clId="{8D9901AA-0508-43E4-B5FE-8E3D12EA834E}" dt="2023-03-05T15:52:38.370" v="6206"/>
         <pc:sldMkLst>
           <pc:docMk/>
           <pc:sldMk cId="992625881" sldId="260"/>
@@ -1136,7 +1136,7 @@
         </pc:picChg>
       </pc:sldChg>
       <pc:sldChg chg="addSp modSp add mod ord modNotesTx">
-        <pc:chgData name="Chinthalanka Wijesinghe" userId="938c8838-3479-4f4c-85d6-560499bd7008" providerId="ADAL" clId="{8D9901AA-0508-43E4-B5FE-8E3D12EA834E}" dt="2023-03-01T12:15:26.107" v="6020" actId="20577"/>
+        <pc:chgData name="Chinthalanka Wijesinghe" userId="938c8838-3479-4f4c-85d6-560499bd7008" providerId="ADAL" clId="{8D9901AA-0508-43E4-B5FE-8E3D12EA834E}" dt="2023-03-05T15:32:17.388" v="6204" actId="6549"/>
         <pc:sldMkLst>
           <pc:docMk/>
           <pc:sldMk cId="780124538" sldId="262"/>
@@ -1150,7 +1150,7 @@
           </ac:spMkLst>
         </pc:spChg>
         <pc:spChg chg="mod">
-          <ac:chgData name="Chinthalanka Wijesinghe" userId="938c8838-3479-4f4c-85d6-560499bd7008" providerId="ADAL" clId="{8D9901AA-0508-43E4-B5FE-8E3D12EA834E}" dt="2023-03-01T12:15:26.107" v="6020" actId="20577"/>
+          <ac:chgData name="Chinthalanka Wijesinghe" userId="938c8838-3479-4f4c-85d6-560499bd7008" providerId="ADAL" clId="{8D9901AA-0508-43E4-B5FE-8E3D12EA834E}" dt="2023-03-05T15:32:17.388" v="6204" actId="6549"/>
           <ac:spMkLst>
             <pc:docMk/>
             <pc:sldMk cId="780124538" sldId="262"/>
@@ -1293,7 +1293,7 @@
         </pc:picChg>
       </pc:sldChg>
       <pc:sldChg chg="addSp modSp add mod">
-        <pc:chgData name="Chinthalanka Wijesinghe" userId="938c8838-3479-4f4c-85d6-560499bd7008" providerId="ADAL" clId="{8D9901AA-0508-43E4-B5FE-8E3D12EA834E}" dt="2023-03-01T11:48:23.402" v="5923" actId="14100"/>
+        <pc:chgData name="Chinthalanka Wijesinghe" userId="938c8838-3479-4f4c-85d6-560499bd7008" providerId="ADAL" clId="{8D9901AA-0508-43E4-B5FE-8E3D12EA834E}" dt="2023-03-05T15:31:20.166" v="6180" actId="207"/>
         <pc:sldMkLst>
           <pc:docMk/>
           <pc:sldMk cId="3100794096" sldId="265"/>
@@ -1339,7 +1339,7 @@
           </ac:spMkLst>
         </pc:spChg>
         <pc:spChg chg="mod">
-          <ac:chgData name="Chinthalanka Wijesinghe" userId="938c8838-3479-4f4c-85d6-560499bd7008" providerId="ADAL" clId="{8D9901AA-0508-43E4-B5FE-8E3D12EA834E}" dt="2023-03-01T11:48:23.402" v="5923" actId="14100"/>
+          <ac:chgData name="Chinthalanka Wijesinghe" userId="938c8838-3479-4f4c-85d6-560499bd7008" providerId="ADAL" clId="{8D9901AA-0508-43E4-B5FE-8E3D12EA834E}" dt="2023-03-05T15:31:20.166" v="6180" actId="207"/>
           <ac:spMkLst>
             <pc:docMk/>
             <pc:sldMk cId="3100794096" sldId="265"/>
@@ -1348,7 +1348,7 @@
         </pc:spChg>
       </pc:sldChg>
       <pc:sldChg chg="addSp delSp modSp add mod">
-        <pc:chgData name="Chinthalanka Wijesinghe" userId="938c8838-3479-4f4c-85d6-560499bd7008" providerId="ADAL" clId="{8D9901AA-0508-43E4-B5FE-8E3D12EA834E}" dt="2023-03-01T08:51:32.601" v="4686" actId="1036"/>
+        <pc:chgData name="Chinthalanka Wijesinghe" userId="938c8838-3479-4f4c-85d6-560499bd7008" providerId="ADAL" clId="{8D9901AA-0508-43E4-B5FE-8E3D12EA834E}" dt="2023-03-05T15:24:34.115" v="6028" actId="14826"/>
         <pc:sldMkLst>
           <pc:docMk/>
           <pc:sldMk cId="687151195" sldId="266"/>
@@ -1474,7 +1474,7 @@
           </ac:picMkLst>
         </pc:picChg>
         <pc:picChg chg="add mod">
-          <ac:chgData name="Chinthalanka Wijesinghe" userId="938c8838-3479-4f4c-85d6-560499bd7008" providerId="ADAL" clId="{8D9901AA-0508-43E4-B5FE-8E3D12EA834E}" dt="2023-03-01T08:51:32.601" v="4686" actId="1036"/>
+          <ac:chgData name="Chinthalanka Wijesinghe" userId="938c8838-3479-4f4c-85d6-560499bd7008" providerId="ADAL" clId="{8D9901AA-0508-43E4-B5FE-8E3D12EA834E}" dt="2023-03-05T15:23:52.585" v="6021" actId="14826"/>
           <ac:picMkLst>
             <pc:docMk/>
             <pc:sldMk cId="687151195" sldId="266"/>
@@ -1482,7 +1482,7 @@
           </ac:picMkLst>
         </pc:picChg>
         <pc:picChg chg="add mod">
-          <ac:chgData name="Chinthalanka Wijesinghe" userId="938c8838-3479-4f4c-85d6-560499bd7008" providerId="ADAL" clId="{8D9901AA-0508-43E4-B5FE-8E3D12EA834E}" dt="2023-03-01T08:51:32.601" v="4686" actId="1036"/>
+          <ac:chgData name="Chinthalanka Wijesinghe" userId="938c8838-3479-4f4c-85d6-560499bd7008" providerId="ADAL" clId="{8D9901AA-0508-43E4-B5FE-8E3D12EA834E}" dt="2023-03-05T15:24:11.876" v="6024" actId="14826"/>
           <ac:picMkLst>
             <pc:docMk/>
             <pc:sldMk cId="687151195" sldId="266"/>
@@ -1490,7 +1490,7 @@
           </ac:picMkLst>
         </pc:picChg>
         <pc:picChg chg="add mod">
-          <ac:chgData name="Chinthalanka Wijesinghe" userId="938c8838-3479-4f4c-85d6-560499bd7008" providerId="ADAL" clId="{8D9901AA-0508-43E4-B5FE-8E3D12EA834E}" dt="2023-03-01T08:51:32.601" v="4686" actId="1036"/>
+          <ac:chgData name="Chinthalanka Wijesinghe" userId="938c8838-3479-4f4c-85d6-560499bd7008" providerId="ADAL" clId="{8D9901AA-0508-43E4-B5FE-8E3D12EA834E}" dt="2023-03-05T15:24:19.435" v="6025" actId="14826"/>
           <ac:picMkLst>
             <pc:docMk/>
             <pc:sldMk cId="687151195" sldId="266"/>
@@ -1498,7 +1498,7 @@
           </ac:picMkLst>
         </pc:picChg>
         <pc:picChg chg="add mod">
-          <ac:chgData name="Chinthalanka Wijesinghe" userId="938c8838-3479-4f4c-85d6-560499bd7008" providerId="ADAL" clId="{8D9901AA-0508-43E4-B5FE-8E3D12EA834E}" dt="2023-03-01T08:51:32.601" v="4686" actId="1036"/>
+          <ac:chgData name="Chinthalanka Wijesinghe" userId="938c8838-3479-4f4c-85d6-560499bd7008" providerId="ADAL" clId="{8D9901AA-0508-43E4-B5FE-8E3D12EA834E}" dt="2023-03-05T15:24:26.867" v="6027" actId="14826"/>
           <ac:picMkLst>
             <pc:docMk/>
             <pc:sldMk cId="687151195" sldId="266"/>
@@ -1506,7 +1506,7 @@
           </ac:picMkLst>
         </pc:picChg>
         <pc:picChg chg="add mod">
-          <ac:chgData name="Chinthalanka Wijesinghe" userId="938c8838-3479-4f4c-85d6-560499bd7008" providerId="ADAL" clId="{8D9901AA-0508-43E4-B5FE-8E3D12EA834E}" dt="2023-03-01T08:51:32.601" v="4686" actId="1036"/>
+          <ac:chgData name="Chinthalanka Wijesinghe" userId="938c8838-3479-4f4c-85d6-560499bd7008" providerId="ADAL" clId="{8D9901AA-0508-43E4-B5FE-8E3D12EA834E}" dt="2023-03-05T15:24:34.115" v="6028" actId="14826"/>
           <ac:picMkLst>
             <pc:docMk/>
             <pc:sldMk cId="687151195" sldId="266"/>
@@ -1515,7 +1515,7 @@
         </pc:picChg>
       </pc:sldChg>
       <pc:sldChg chg="addSp delSp modSp add mod">
-        <pc:chgData name="Chinthalanka Wijesinghe" userId="938c8838-3479-4f4c-85d6-560499bd7008" providerId="ADAL" clId="{8D9901AA-0508-43E4-B5FE-8E3D12EA834E}" dt="2023-03-01T08:52:48.708" v="4772" actId="1036"/>
+        <pc:chgData name="Chinthalanka Wijesinghe" userId="938c8838-3479-4f4c-85d6-560499bd7008" providerId="ADAL" clId="{8D9901AA-0508-43E4-B5FE-8E3D12EA834E}" dt="2023-03-05T15:25:03.567" v="6029" actId="14826"/>
         <pc:sldMkLst>
           <pc:docMk/>
           <pc:sldMk cId="1479150921" sldId="267"/>
@@ -1529,7 +1529,7 @@
           </ac:spMkLst>
         </pc:spChg>
         <pc:picChg chg="add mod">
-          <ac:chgData name="Chinthalanka Wijesinghe" userId="938c8838-3479-4f4c-85d6-560499bd7008" providerId="ADAL" clId="{8D9901AA-0508-43E4-B5FE-8E3D12EA834E}" dt="2023-03-01T08:52:48.708" v="4772" actId="1036"/>
+          <ac:chgData name="Chinthalanka Wijesinghe" userId="938c8838-3479-4f4c-85d6-560499bd7008" providerId="ADAL" clId="{8D9901AA-0508-43E4-B5FE-8E3D12EA834E}" dt="2023-03-05T15:25:03.567" v="6029" actId="14826"/>
           <ac:picMkLst>
             <pc:docMk/>
             <pc:sldMk cId="1479150921" sldId="267"/>
@@ -3089,7 +3089,7 @@
           <a:p>
             <a:fld id="{D577871D-54C8-43AE-B740-675F7C4F6B4D}" type="datetimeFigureOut">
               <a:rPr lang="en-US" smtClean="0"/>
-              <a:t>3/1/2023</a:t>
+              <a:t>3/5/2023</a:t>
             </a:fld>
             <a:endParaRPr lang="en-US"/>
           </a:p>
@@ -4554,7 +4554,7 @@
           <a:p>
             <a:fld id="{3341EE12-F28E-4B03-A404-A8FCAE0F6316}" type="datetime1">
               <a:rPr lang="en-US" smtClean="0"/>
-              <a:t>3/1/2023</a:t>
+              <a:t>3/5/2023</a:t>
             </a:fld>
             <a:endParaRPr lang="en-US" dirty="0"/>
           </a:p>
@@ -4839,7 +4839,7 @@
           <a:p>
             <a:fld id="{B68B8189-0D9C-48A6-9FA3-862227B094CE}" type="datetime1">
               <a:rPr lang="en-US" smtClean="0"/>
-              <a:t>3/1/2023</a:t>
+              <a:t>3/5/2023</a:t>
             </a:fld>
             <a:endParaRPr lang="en-US"/>
           </a:p>
@@ -5203,7 +5203,7 @@
           <a:p>
             <a:fld id="{26ADDCAE-6443-42C3-9C19-F95985500186}" type="datetime1">
               <a:rPr lang="en-US" smtClean="0"/>
-              <a:t>3/1/2023</a:t>
+              <a:t>3/5/2023</a:t>
             </a:fld>
             <a:endParaRPr lang="en-US" dirty="0"/>
           </a:p>
@@ -5465,7 +5465,7 @@
           <a:p>
             <a:fld id="{1962799E-EB8E-4038-8063-81BB57C732D4}" type="datetime1">
               <a:rPr lang="en-US" smtClean="0"/>
-              <a:t>3/1/2023</a:t>
+              <a:t>3/5/2023</a:t>
             </a:fld>
             <a:endParaRPr lang="en-US"/>
           </a:p>
@@ -5895,7 +5895,7 @@
           <a:p>
             <a:fld id="{217A73C3-B243-44D3-809D-EF8FDFBD85D4}" type="datetime1">
               <a:rPr lang="en-US" smtClean="0"/>
-              <a:t>3/1/2023</a:t>
+              <a:t>3/5/2023</a:t>
             </a:fld>
             <a:endParaRPr lang="en-US" dirty="0"/>
           </a:p>
@@ -6226,7 +6226,7 @@
           <a:p>
             <a:fld id="{C9B6D3E3-28E2-4380-A113-67698215C5F8}" type="datetime1">
               <a:rPr lang="en-US" smtClean="0"/>
-              <a:t>3/1/2023</a:t>
+              <a:t>3/5/2023</a:t>
             </a:fld>
             <a:endParaRPr lang="en-US" dirty="0"/>
           </a:p>
@@ -6659,7 +6659,7 @@
           <a:p>
             <a:fld id="{A9EFCB61-04AD-47C9-BF79-2BD8B9CEC07A}" type="datetime1">
               <a:rPr lang="en-US" smtClean="0"/>
-              <a:t>3/1/2023</a:t>
+              <a:t>3/5/2023</a:t>
             </a:fld>
             <a:endParaRPr lang="en-US" dirty="0"/>
           </a:p>
@@ -6811,7 +6811,7 @@
           <a:p>
             <a:fld id="{A4535E0C-D585-492F-8146-7493F4086301}" type="datetime1">
               <a:rPr lang="en-US" smtClean="0"/>
-              <a:t>3/1/2023</a:t>
+              <a:t>3/5/2023</a:t>
             </a:fld>
             <a:endParaRPr lang="en-US"/>
           </a:p>
@@ -6974,7 +6974,7 @@
           <a:p>
             <a:fld id="{8CE48390-48B5-49AB-B019-A7C8FB8C31F6}" type="datetime1">
               <a:rPr lang="en-US" smtClean="0"/>
-              <a:t>3/1/2023</a:t>
+              <a:t>3/5/2023</a:t>
             </a:fld>
             <a:endParaRPr lang="en-US"/>
           </a:p>
@@ -7503,7 +7503,7 @@
           <a:p>
             <a:fld id="{962E767E-8A14-4E70-91B9-2101CBC4D7BD}" type="datetime1">
               <a:rPr lang="en-US" smtClean="0"/>
-              <a:t>3/1/2023</a:t>
+              <a:t>3/5/2023</a:t>
             </a:fld>
             <a:endParaRPr lang="en-US" dirty="0"/>
           </a:p>
@@ -8024,7 +8024,7 @@
           <a:p>
             <a:fld id="{01AF0C4B-5A4A-45CA-ABEC-10F107160D33}" type="datetime1">
               <a:rPr lang="en-US" smtClean="0"/>
-              <a:t>3/1/2023</a:t>
+              <a:t>3/5/2023</a:t>
             </a:fld>
             <a:endParaRPr lang="en-US" dirty="0"/>
           </a:p>
@@ -8574,7 +8574,7 @@
           <a:p>
             <a:fld id="{6989806E-8E94-473C-AEE7-BE6F15F85533}" type="datetime1">
               <a:rPr lang="en-US" smtClean="0"/>
-              <a:t>3/1/2023</a:t>
+              <a:t>3/5/2023</a:t>
             </a:fld>
             <a:endParaRPr lang="en-US" dirty="0"/>
           </a:p>
@@ -9916,6 +9916,19 @@
             </a:r>
           </a:p>
           <a:p>
+            <a:pPr marL="571500" lvl="1" indent="-342900">
+              <a:lnSpc>
+                <a:spcPct val="100000"/>
+              </a:lnSpc>
+              <a:buFont typeface="Arial" panose="020B0604020202020204" pitchFamily="34" charset="0"/>
+              <a:buChar char="•"/>
+            </a:pPr>
+            <a:r>
+              <a:rPr lang="en-US" sz="1600" dirty="0"/>
+              <a:t>After the data is loaded to the memory in the first iteration, it takes only around 1s to run the queries in subsequent iteration</a:t>
+            </a:r>
+          </a:p>
+          <a:p>
             <a:pPr marL="342900" indent="-342900">
               <a:lnSpc>
                 <a:spcPct val="100000"/>
@@ -9986,7 +9999,19 @@
             </a:pPr>
             <a:r>
               <a:rPr lang="en-US" sz="1800" dirty="0"/>
-              <a:t>Spark SQL can be used through various interfaces, including Spark shell, notebooks and development environments.</a:t>
+              <a:t>Writing </a:t>
+            </a:r>
+            <a:r>
+              <a:rPr lang="en-US" sz="1800" dirty="0">
+                <a:solidFill>
+                  <a:srgbClr val="00B0F0"/>
+                </a:solidFill>
+              </a:rPr>
+              <a:t>low-level code </a:t>
+            </a:r>
+            <a:r>
+              <a:rPr lang="en-US" sz="1800" dirty="0"/>
+              <a:t>in MapReduce makes it more complex to use</a:t>
             </a:r>
           </a:p>
           <a:p>
@@ -10020,31 +10045,6 @@
                 </a:solidFill>
               </a:rPr>
               <a:t>variety of data processing libraries</a:t>
-            </a:r>
-          </a:p>
-          <a:p>
-            <a:pPr marL="342900" indent="-342900">
-              <a:lnSpc>
-                <a:spcPct val="100000"/>
-              </a:lnSpc>
-              <a:buFont typeface="Wingdings" panose="05000000000000000000" pitchFamily="2" charset="2"/>
-              <a:buChar char="§"/>
-            </a:pPr>
-            <a:r>
-              <a:rPr lang="en-US" sz="1800" dirty="0"/>
-              <a:t>Need to write </a:t>
-            </a:r>
-            <a:r>
-              <a:rPr lang="en-US" sz="1800" dirty="0">
-                <a:solidFill>
-                  <a:srgbClr val="00B0F0"/>
-                </a:solidFill>
-              </a:rPr>
-              <a:t>low-level code </a:t>
-            </a:r>
-            <a:r>
-              <a:rPr lang="en-US" sz="1800" dirty="0"/>
-              <a:t>in MapReduce makes it more complex to use</a:t>
             </a:r>
           </a:p>
         </p:txBody>
@@ -16004,7 +16004,35 @@
             </a:r>
             <a:r>
               <a:rPr lang="en-US" sz="1600" dirty="0"/>
-              <a:t>&lt;sql_script&gt;</a:t>
+              <a:t>&lt;</a:t>
+            </a:r>
+            <a:r>
+              <a:rPr lang="en-US" sz="1600" dirty="0" err="1"/>
+              <a:t>sql_script</a:t>
+            </a:r>
+            <a:r>
+              <a:rPr lang="en-US" sz="1600" dirty="0"/>
+              <a:t>&gt; iterative </a:t>
+            </a:r>
+            <a:r>
+              <a:rPr lang="en-US" sz="1600" dirty="0">
+                <a:solidFill>
+                  <a:srgbClr val="0070C0"/>
+                </a:solidFill>
+              </a:rPr>
+              <a:t>--</a:t>
+            </a:r>
+            <a:r>
+              <a:rPr lang="en-US" sz="1600" dirty="0" err="1">
+                <a:solidFill>
+                  <a:srgbClr val="FA9500"/>
+                </a:solidFill>
+              </a:rPr>
+              <a:t>num_iter</a:t>
+            </a:r>
+            <a:r>
+              <a:rPr lang="en-US" sz="1600" dirty="0"/>
+              <a:t> 5</a:t>
             </a:r>
           </a:p>
         </p:txBody>
@@ -16201,7 +16229,7 @@
       </p:sp>
       <p:pic>
         <p:nvPicPr>
-          <p:cNvPr id="23" name="Picture 22" descr="Chart, bar chart&#10;&#10;Description automatically generated">
+          <p:cNvPr id="23" name="Picture 22">
             <a:extLst>
               <a:ext uri="{FF2B5EF4-FFF2-40B4-BE49-F238E27FC236}">
                 <a16:creationId xmlns:a16="http://schemas.microsoft.com/office/drawing/2014/main" id="{2C152DAD-BA9B-C332-F99A-86922F630821}"/>
@@ -16221,14 +16249,13 @@
               </a:ext>
             </a:extLst>
           </a:blip>
-          <a:stretch>
-            <a:fillRect/>
-          </a:stretch>
+          <a:srcRect/>
+          <a:stretch/>
         </p:blipFill>
         <p:spPr>
           <a:xfrm>
-            <a:off x="191445" y="1549752"/>
-            <a:ext cx="3804086" cy="2035429"/>
+            <a:off x="212985" y="1549752"/>
+            <a:ext cx="3761006" cy="2035429"/>
           </a:xfrm>
           <a:prstGeom prst="rect">
             <a:avLst/>
@@ -16237,7 +16264,7 @@
       </p:pic>
       <p:pic>
         <p:nvPicPr>
-          <p:cNvPr id="25" name="Picture 24" descr="Chart, bar chart&#10;&#10;Description automatically generated">
+          <p:cNvPr id="25" name="Picture 24">
             <a:extLst>
               <a:ext uri="{FF2B5EF4-FFF2-40B4-BE49-F238E27FC236}">
                 <a16:creationId xmlns:a16="http://schemas.microsoft.com/office/drawing/2014/main" id="{CC9178B7-41C1-5B2B-F9B8-0590A03EADBE}"/>
@@ -16257,14 +16284,13 @@
               </a:ext>
             </a:extLst>
           </a:blip>
-          <a:stretch>
-            <a:fillRect/>
-          </a:stretch>
+          <a:srcRect/>
+          <a:stretch/>
         </p:blipFill>
         <p:spPr>
           <a:xfrm>
-            <a:off x="4256389" y="1549752"/>
-            <a:ext cx="3733529" cy="2032586"/>
+            <a:off x="4297172" y="1549752"/>
+            <a:ext cx="3651963" cy="2032586"/>
           </a:xfrm>
           <a:prstGeom prst="rect">
             <a:avLst/>
@@ -16273,7 +16299,7 @@
       </p:pic>
       <p:pic>
         <p:nvPicPr>
-          <p:cNvPr id="27" name="Picture 26" descr="Chart, bar chart&#10;&#10;Description automatically generated">
+          <p:cNvPr id="27" name="Picture 26">
             <a:extLst>
               <a:ext uri="{FF2B5EF4-FFF2-40B4-BE49-F238E27FC236}">
                 <a16:creationId xmlns:a16="http://schemas.microsoft.com/office/drawing/2014/main" id="{4B9CE05E-A661-222C-D8EC-1AA83370DEC1}"/>
@@ -16293,14 +16319,13 @@
               </a:ext>
             </a:extLst>
           </a:blip>
-          <a:stretch>
-            <a:fillRect/>
-          </a:stretch>
+          <a:srcRect/>
+          <a:stretch/>
         </p:blipFill>
         <p:spPr>
           <a:xfrm>
-            <a:off x="8250776" y="1549752"/>
-            <a:ext cx="3784161" cy="2032586"/>
+            <a:off x="8268133" y="1549752"/>
+            <a:ext cx="3749446" cy="2032586"/>
           </a:xfrm>
           <a:prstGeom prst="rect">
             <a:avLst/>
@@ -16309,7 +16334,7 @@
       </p:pic>
       <p:pic>
         <p:nvPicPr>
-          <p:cNvPr id="29" name="Picture 28" descr="Chart, bar chart&#10;&#10;Description automatically generated">
+          <p:cNvPr id="29" name="Picture 28">
             <a:extLst>
               <a:ext uri="{FF2B5EF4-FFF2-40B4-BE49-F238E27FC236}">
                 <a16:creationId xmlns:a16="http://schemas.microsoft.com/office/drawing/2014/main" id="{2AB8C745-A75E-7BD7-5A9D-E87C8C9E8164}"/>
@@ -16329,14 +16354,13 @@
               </a:ext>
             </a:extLst>
           </a:blip>
-          <a:stretch>
-            <a:fillRect/>
-          </a:stretch>
+          <a:srcRect/>
+          <a:stretch/>
         </p:blipFill>
         <p:spPr>
           <a:xfrm>
-            <a:off x="2362310" y="4202678"/>
-            <a:ext cx="3788158" cy="2028688"/>
+            <a:off x="2379005" y="4202678"/>
+            <a:ext cx="3707073" cy="2028688"/>
           </a:xfrm>
           <a:prstGeom prst="rect">
             <a:avLst/>
@@ -16345,7 +16369,7 @@
       </p:pic>
       <p:pic>
         <p:nvPicPr>
-          <p:cNvPr id="31" name="Picture 30" descr="Chart, bar chart&#10;&#10;Description automatically generated">
+          <p:cNvPr id="31" name="Picture 30">
             <a:extLst>
               <a:ext uri="{FF2B5EF4-FFF2-40B4-BE49-F238E27FC236}">
                 <a16:creationId xmlns:a16="http://schemas.microsoft.com/office/drawing/2014/main" id="{F1C46E21-9DC1-D9F3-254F-29A07E563792}"/>
@@ -16365,14 +16389,13 @@
               </a:ext>
             </a:extLst>
           </a:blip>
-          <a:stretch>
-            <a:fillRect/>
-          </a:stretch>
+          <a:srcRect/>
+          <a:stretch/>
         </p:blipFill>
         <p:spPr>
           <a:xfrm>
-            <a:off x="6850663" y="4202678"/>
-            <a:ext cx="3784161" cy="2032586"/>
+            <a:off x="6870580" y="4202678"/>
+            <a:ext cx="3744327" cy="2032586"/>
           </a:xfrm>
           <a:prstGeom prst="rect">
             <a:avLst/>
@@ -16463,7 +16486,7 @@
       </p:sp>
       <p:pic>
         <p:nvPicPr>
-          <p:cNvPr id="4" name="Picture 3" descr="Chart, bar chart&#10;&#10;Description automatically generated">
+          <p:cNvPr id="4" name="Picture 3">
             <a:extLst>
               <a:ext uri="{FF2B5EF4-FFF2-40B4-BE49-F238E27FC236}">
                 <a16:creationId xmlns:a16="http://schemas.microsoft.com/office/drawing/2014/main" id="{5D5E0F4C-22FC-82F9-B571-A2B1C9FE4289}"/>
@@ -16483,14 +16506,13 @@
               </a:ext>
             </a:extLst>
           </a:blip>
-          <a:stretch>
-            <a:fillRect/>
-          </a:stretch>
+          <a:srcRect/>
+          <a:stretch/>
         </p:blipFill>
         <p:spPr>
           <a:xfrm>
-            <a:off x="2143260" y="1745955"/>
-            <a:ext cx="7905480" cy="3962438"/>
+            <a:off x="2178871" y="1745955"/>
+            <a:ext cx="7834257" cy="3962438"/>
           </a:xfrm>
           <a:prstGeom prst="rect">
             <a:avLst/>

</xml_diff>